<commit_message>
revise term project for 2019-fall semester
</commit_message>
<xml_diff>
--- a/lectures/term_project/term_project.pptx
+++ b/lectures/term_project/term_project.pptx
@@ -1403,7 +1403,7 @@
           <a:p>
             <a:pPr lvl="0"/>
             <a:r>
-              <a:rPr lang="zh-TW" altLang="en-US" noProof="0" smtClean="0"/>
+              <a:rPr lang="zh-TW" altLang="en-US" noProof="0"/>
               <a:t>按一下以編輯母片標題樣式</a:t>
             </a:r>
           </a:p>
@@ -1437,7 +1437,7 @@
           <a:p>
             <a:pPr lvl="0"/>
             <a:r>
-              <a:rPr lang="zh-TW" altLang="en-US" noProof="0" smtClean="0"/>
+              <a:rPr lang="zh-TW" altLang="en-US" noProof="0"/>
               <a:t>按一下以編輯母片副標題樣式</a:t>
             </a:r>
           </a:p>
@@ -1601,10 +1601,9 @@
           <a:lstStyle/>
           <a:p>
             <a:r>
-              <a:rPr lang="zh-TW" altLang="en-US" smtClean="0"/>
+              <a:rPr lang="zh-TW" altLang="en-US"/>
               <a:t>按一下以編輯母片標題樣式</a:t>
             </a:r>
-            <a:endParaRPr lang="zh-TW" altLang="en-US"/>
           </a:p>
         </p:txBody>
       </p:sp>
@@ -1625,38 +1624,37 @@
           <a:p>
             <a:pPr lvl="0"/>
             <a:r>
-              <a:rPr lang="zh-TW" altLang="en-US" smtClean="0"/>
+              <a:rPr lang="zh-TW" altLang="en-US"/>
               <a:t>按一下以編輯母片文字樣式</a:t>
             </a:r>
           </a:p>
           <a:p>
             <a:pPr lvl="1"/>
             <a:r>
-              <a:rPr lang="zh-TW" altLang="en-US" smtClean="0"/>
+              <a:rPr lang="zh-TW" altLang="en-US"/>
               <a:t>第二層</a:t>
             </a:r>
           </a:p>
           <a:p>
             <a:pPr lvl="2"/>
             <a:r>
-              <a:rPr lang="zh-TW" altLang="en-US" smtClean="0"/>
+              <a:rPr lang="zh-TW" altLang="en-US"/>
               <a:t>第三層</a:t>
             </a:r>
           </a:p>
           <a:p>
             <a:pPr lvl="3"/>
             <a:r>
-              <a:rPr lang="zh-TW" altLang="en-US" smtClean="0"/>
+              <a:rPr lang="zh-TW" altLang="en-US"/>
               <a:t>第四層</a:t>
             </a:r>
           </a:p>
           <a:p>
             <a:pPr lvl="4"/>
             <a:r>
-              <a:rPr lang="zh-TW" altLang="en-US" smtClean="0"/>
+              <a:rPr lang="zh-TW" altLang="en-US"/>
               <a:t>第五層</a:t>
             </a:r>
-            <a:endParaRPr lang="zh-TW" altLang="en-US"/>
           </a:p>
         </p:txBody>
       </p:sp>
@@ -1802,10 +1800,9 @@
           <a:lstStyle/>
           <a:p>
             <a:r>
-              <a:rPr lang="zh-TW" altLang="en-US" smtClean="0"/>
+              <a:rPr lang="zh-TW" altLang="en-US"/>
               <a:t>按一下以編輯母片標題樣式</a:t>
             </a:r>
-            <a:endParaRPr lang="zh-TW" altLang="en-US"/>
           </a:p>
         </p:txBody>
       </p:sp>
@@ -1831,38 +1828,37 @@
           <a:p>
             <a:pPr lvl="0"/>
             <a:r>
-              <a:rPr lang="zh-TW" altLang="en-US" smtClean="0"/>
+              <a:rPr lang="zh-TW" altLang="en-US"/>
               <a:t>按一下以編輯母片文字樣式</a:t>
             </a:r>
           </a:p>
           <a:p>
             <a:pPr lvl="1"/>
             <a:r>
-              <a:rPr lang="zh-TW" altLang="en-US" smtClean="0"/>
+              <a:rPr lang="zh-TW" altLang="en-US"/>
               <a:t>第二層</a:t>
             </a:r>
           </a:p>
           <a:p>
             <a:pPr lvl="2"/>
             <a:r>
-              <a:rPr lang="zh-TW" altLang="en-US" smtClean="0"/>
+              <a:rPr lang="zh-TW" altLang="en-US"/>
               <a:t>第三層</a:t>
             </a:r>
           </a:p>
           <a:p>
             <a:pPr lvl="3"/>
             <a:r>
-              <a:rPr lang="zh-TW" altLang="en-US" smtClean="0"/>
+              <a:rPr lang="zh-TW" altLang="en-US"/>
               <a:t>第四層</a:t>
             </a:r>
           </a:p>
           <a:p>
             <a:pPr lvl="4"/>
             <a:r>
-              <a:rPr lang="zh-TW" altLang="en-US" smtClean="0"/>
+              <a:rPr lang="zh-TW" altLang="en-US"/>
               <a:t>第五層</a:t>
             </a:r>
-            <a:endParaRPr lang="zh-TW" altLang="en-US"/>
           </a:p>
         </p:txBody>
       </p:sp>
@@ -2003,10 +1999,9 @@
           <a:lstStyle/>
           <a:p>
             <a:r>
-              <a:rPr lang="zh-TW" altLang="en-US" smtClean="0"/>
+              <a:rPr lang="zh-TW" altLang="en-US"/>
               <a:t>按一下以編輯母片標題樣式</a:t>
             </a:r>
-            <a:endParaRPr lang="zh-TW" altLang="en-US"/>
           </a:p>
         </p:txBody>
       </p:sp>
@@ -2027,38 +2022,37 @@
           <a:p>
             <a:pPr lvl="0"/>
             <a:r>
-              <a:rPr lang="zh-TW" altLang="en-US" smtClean="0"/>
+              <a:rPr lang="zh-TW" altLang="en-US"/>
               <a:t>按一下以編輯母片文字樣式</a:t>
             </a:r>
           </a:p>
           <a:p>
             <a:pPr lvl="1"/>
             <a:r>
-              <a:rPr lang="zh-TW" altLang="en-US" smtClean="0"/>
+              <a:rPr lang="zh-TW" altLang="en-US"/>
               <a:t>第二層</a:t>
             </a:r>
           </a:p>
           <a:p>
             <a:pPr lvl="2"/>
             <a:r>
-              <a:rPr lang="zh-TW" altLang="en-US" smtClean="0"/>
+              <a:rPr lang="zh-TW" altLang="en-US"/>
               <a:t>第三層</a:t>
             </a:r>
           </a:p>
           <a:p>
             <a:pPr lvl="3"/>
             <a:r>
-              <a:rPr lang="zh-TW" altLang="en-US" smtClean="0"/>
+              <a:rPr lang="zh-TW" altLang="en-US"/>
               <a:t>第四層</a:t>
             </a:r>
           </a:p>
           <a:p>
             <a:pPr lvl="4"/>
             <a:r>
-              <a:rPr lang="zh-TW" altLang="en-US" smtClean="0"/>
+              <a:rPr lang="zh-TW" altLang="en-US"/>
               <a:t>第五層</a:t>
             </a:r>
-            <a:endParaRPr lang="zh-TW" altLang="en-US"/>
           </a:p>
         </p:txBody>
       </p:sp>
@@ -2208,10 +2202,9 @@
           </a:lstStyle>
           <a:p>
             <a:r>
-              <a:rPr lang="zh-TW" altLang="en-US" smtClean="0"/>
+              <a:rPr lang="zh-TW" altLang="en-US"/>
               <a:t>按一下以編輯母片標題樣式</a:t>
             </a:r>
-            <a:endParaRPr lang="zh-TW" altLang="en-US"/>
           </a:p>
         </p:txBody>
       </p:sp>
@@ -2274,7 +2267,7 @@
           <a:p>
             <a:pPr lvl="0"/>
             <a:r>
-              <a:rPr lang="zh-TW" altLang="en-US" smtClean="0"/>
+              <a:rPr lang="zh-TW" altLang="en-US"/>
               <a:t>按一下以編輯母片文字樣式</a:t>
             </a:r>
           </a:p>
@@ -2417,10 +2410,9 @@
           <a:lstStyle/>
           <a:p>
             <a:r>
-              <a:rPr lang="zh-TW" altLang="en-US" smtClean="0"/>
+              <a:rPr lang="zh-TW" altLang="en-US"/>
               <a:t>按一下以編輯母片標題樣式</a:t>
             </a:r>
-            <a:endParaRPr lang="zh-TW" altLang="en-US"/>
           </a:p>
         </p:txBody>
       </p:sp>
@@ -2446,38 +2438,37 @@
           <a:p>
             <a:pPr lvl="0"/>
             <a:r>
-              <a:rPr lang="zh-TW" altLang="en-US" smtClean="0"/>
+              <a:rPr lang="zh-TW" altLang="en-US"/>
               <a:t>按一下以編輯母片文字樣式</a:t>
             </a:r>
           </a:p>
           <a:p>
             <a:pPr lvl="1"/>
             <a:r>
-              <a:rPr lang="zh-TW" altLang="en-US" smtClean="0"/>
+              <a:rPr lang="zh-TW" altLang="en-US"/>
               <a:t>第二層</a:t>
             </a:r>
           </a:p>
           <a:p>
             <a:pPr lvl="2"/>
             <a:r>
-              <a:rPr lang="zh-TW" altLang="en-US" smtClean="0"/>
+              <a:rPr lang="zh-TW" altLang="en-US"/>
               <a:t>第三層</a:t>
             </a:r>
           </a:p>
           <a:p>
             <a:pPr lvl="3"/>
             <a:r>
-              <a:rPr lang="zh-TW" altLang="en-US" smtClean="0"/>
+              <a:rPr lang="zh-TW" altLang="en-US"/>
               <a:t>第四層</a:t>
             </a:r>
           </a:p>
           <a:p>
             <a:pPr lvl="4"/>
             <a:r>
-              <a:rPr lang="zh-TW" altLang="en-US" smtClean="0"/>
+              <a:rPr lang="zh-TW" altLang="en-US"/>
               <a:t>第五層</a:t>
             </a:r>
-            <a:endParaRPr lang="zh-TW" altLang="en-US"/>
           </a:p>
         </p:txBody>
       </p:sp>
@@ -2503,38 +2494,37 @@
           <a:p>
             <a:pPr lvl="0"/>
             <a:r>
-              <a:rPr lang="zh-TW" altLang="en-US" smtClean="0"/>
+              <a:rPr lang="zh-TW" altLang="en-US"/>
               <a:t>按一下以編輯母片文字樣式</a:t>
             </a:r>
           </a:p>
           <a:p>
             <a:pPr lvl="1"/>
             <a:r>
-              <a:rPr lang="zh-TW" altLang="en-US" smtClean="0"/>
+              <a:rPr lang="zh-TW" altLang="en-US"/>
               <a:t>第二層</a:t>
             </a:r>
           </a:p>
           <a:p>
             <a:pPr lvl="2"/>
             <a:r>
-              <a:rPr lang="zh-TW" altLang="en-US" smtClean="0"/>
+              <a:rPr lang="zh-TW" altLang="en-US"/>
               <a:t>第三層</a:t>
             </a:r>
           </a:p>
           <a:p>
             <a:pPr lvl="3"/>
             <a:r>
-              <a:rPr lang="zh-TW" altLang="en-US" smtClean="0"/>
+              <a:rPr lang="zh-TW" altLang="en-US"/>
               <a:t>第四層</a:t>
             </a:r>
           </a:p>
           <a:p>
             <a:pPr lvl="4"/>
             <a:r>
-              <a:rPr lang="zh-TW" altLang="en-US" smtClean="0"/>
+              <a:rPr lang="zh-TW" altLang="en-US"/>
               <a:t>第五層</a:t>
             </a:r>
-            <a:endParaRPr lang="zh-TW" altLang="en-US"/>
           </a:p>
         </p:txBody>
       </p:sp>
@@ -2680,10 +2670,9 @@
           <a:lstStyle/>
           <a:p>
             <a:r>
-              <a:rPr lang="zh-TW" altLang="en-US" smtClean="0"/>
+              <a:rPr lang="zh-TW" altLang="en-US"/>
               <a:t>按一下以編輯母片標題樣式</a:t>
             </a:r>
-            <a:endParaRPr lang="zh-TW" altLang="en-US"/>
           </a:p>
         </p:txBody>
       </p:sp>
@@ -2746,7 +2735,7 @@
           <a:p>
             <a:pPr lvl="0"/>
             <a:r>
-              <a:rPr lang="zh-TW" altLang="en-US" smtClean="0"/>
+              <a:rPr lang="zh-TW" altLang="en-US"/>
               <a:t>按一下以編輯母片文字樣式</a:t>
             </a:r>
           </a:p>
@@ -2774,38 +2763,37 @@
           <a:p>
             <a:pPr lvl="0"/>
             <a:r>
-              <a:rPr lang="zh-TW" altLang="en-US" smtClean="0"/>
+              <a:rPr lang="zh-TW" altLang="en-US"/>
               <a:t>按一下以編輯母片文字樣式</a:t>
             </a:r>
           </a:p>
           <a:p>
             <a:pPr lvl="1"/>
             <a:r>
-              <a:rPr lang="zh-TW" altLang="en-US" smtClean="0"/>
+              <a:rPr lang="zh-TW" altLang="en-US"/>
               <a:t>第二層</a:t>
             </a:r>
           </a:p>
           <a:p>
             <a:pPr lvl="2"/>
             <a:r>
-              <a:rPr lang="zh-TW" altLang="en-US" smtClean="0"/>
+              <a:rPr lang="zh-TW" altLang="en-US"/>
               <a:t>第三層</a:t>
             </a:r>
           </a:p>
           <a:p>
             <a:pPr lvl="3"/>
             <a:r>
-              <a:rPr lang="zh-TW" altLang="en-US" smtClean="0"/>
+              <a:rPr lang="zh-TW" altLang="en-US"/>
               <a:t>第四層</a:t>
             </a:r>
           </a:p>
           <a:p>
             <a:pPr lvl="4"/>
             <a:r>
-              <a:rPr lang="zh-TW" altLang="en-US" smtClean="0"/>
+              <a:rPr lang="zh-TW" altLang="en-US"/>
               <a:t>第五層</a:t>
             </a:r>
-            <a:endParaRPr lang="zh-TW" altLang="en-US"/>
           </a:p>
         </p:txBody>
       </p:sp>
@@ -2868,7 +2856,7 @@
           <a:p>
             <a:pPr lvl="0"/>
             <a:r>
-              <a:rPr lang="zh-TW" altLang="en-US" smtClean="0"/>
+              <a:rPr lang="zh-TW" altLang="en-US"/>
               <a:t>按一下以編輯母片文字樣式</a:t>
             </a:r>
           </a:p>
@@ -2896,38 +2884,37 @@
           <a:p>
             <a:pPr lvl="0"/>
             <a:r>
-              <a:rPr lang="zh-TW" altLang="en-US" smtClean="0"/>
+              <a:rPr lang="zh-TW" altLang="en-US"/>
               <a:t>按一下以編輯母片文字樣式</a:t>
             </a:r>
           </a:p>
           <a:p>
             <a:pPr lvl="1"/>
             <a:r>
-              <a:rPr lang="zh-TW" altLang="en-US" smtClean="0"/>
+              <a:rPr lang="zh-TW" altLang="en-US"/>
               <a:t>第二層</a:t>
             </a:r>
           </a:p>
           <a:p>
             <a:pPr lvl="2"/>
             <a:r>
-              <a:rPr lang="zh-TW" altLang="en-US" smtClean="0"/>
+              <a:rPr lang="zh-TW" altLang="en-US"/>
               <a:t>第三層</a:t>
             </a:r>
           </a:p>
           <a:p>
             <a:pPr lvl="3"/>
             <a:r>
-              <a:rPr lang="zh-TW" altLang="en-US" smtClean="0"/>
+              <a:rPr lang="zh-TW" altLang="en-US"/>
               <a:t>第四層</a:t>
             </a:r>
           </a:p>
           <a:p>
             <a:pPr lvl="4"/>
             <a:r>
-              <a:rPr lang="zh-TW" altLang="en-US" smtClean="0"/>
+              <a:rPr lang="zh-TW" altLang="en-US"/>
               <a:t>第五層</a:t>
             </a:r>
-            <a:endParaRPr lang="zh-TW" altLang="en-US"/>
           </a:p>
         </p:txBody>
       </p:sp>
@@ -3068,10 +3055,9 @@
           <a:lstStyle/>
           <a:p>
             <a:r>
-              <a:rPr lang="zh-TW" altLang="en-US" smtClean="0"/>
+              <a:rPr lang="zh-TW" altLang="en-US"/>
               <a:t>按一下以編輯母片標題樣式</a:t>
             </a:r>
-            <a:endParaRPr lang="zh-TW" altLang="en-US"/>
           </a:p>
         </p:txBody>
       </p:sp>
@@ -3342,10 +3328,9 @@
           </a:lstStyle>
           <a:p>
             <a:r>
-              <a:rPr lang="zh-TW" altLang="en-US" smtClean="0"/>
+              <a:rPr lang="zh-TW" altLang="en-US"/>
               <a:t>按一下以編輯母片標題樣式</a:t>
             </a:r>
-            <a:endParaRPr lang="zh-TW" altLang="en-US"/>
           </a:p>
         </p:txBody>
       </p:sp>
@@ -3399,38 +3384,37 @@
           <a:p>
             <a:pPr lvl="0"/>
             <a:r>
-              <a:rPr lang="zh-TW" altLang="en-US" smtClean="0"/>
+              <a:rPr lang="zh-TW" altLang="en-US"/>
               <a:t>按一下以編輯母片文字樣式</a:t>
             </a:r>
           </a:p>
           <a:p>
             <a:pPr lvl="1"/>
             <a:r>
-              <a:rPr lang="zh-TW" altLang="en-US" smtClean="0"/>
+              <a:rPr lang="zh-TW" altLang="en-US"/>
               <a:t>第二層</a:t>
             </a:r>
           </a:p>
           <a:p>
             <a:pPr lvl="2"/>
             <a:r>
-              <a:rPr lang="zh-TW" altLang="en-US" smtClean="0"/>
+              <a:rPr lang="zh-TW" altLang="en-US"/>
               <a:t>第三層</a:t>
             </a:r>
           </a:p>
           <a:p>
             <a:pPr lvl="3"/>
             <a:r>
-              <a:rPr lang="zh-TW" altLang="en-US" smtClean="0"/>
+              <a:rPr lang="zh-TW" altLang="en-US"/>
               <a:t>第四層</a:t>
             </a:r>
           </a:p>
           <a:p>
             <a:pPr lvl="4"/>
             <a:r>
-              <a:rPr lang="zh-TW" altLang="en-US" smtClean="0"/>
+              <a:rPr lang="zh-TW" altLang="en-US"/>
               <a:t>第五層</a:t>
             </a:r>
-            <a:endParaRPr lang="zh-TW" altLang="en-US"/>
           </a:p>
         </p:txBody>
       </p:sp>
@@ -3493,7 +3477,7 @@
           <a:p>
             <a:pPr lvl="0"/>
             <a:r>
-              <a:rPr lang="zh-TW" altLang="en-US" smtClean="0"/>
+              <a:rPr lang="zh-TW" altLang="en-US"/>
               <a:t>按一下以編輯母片文字樣式</a:t>
             </a:r>
           </a:p>
@@ -3645,10 +3629,9 @@
           </a:lstStyle>
           <a:p>
             <a:r>
-              <a:rPr lang="zh-TW" altLang="en-US" smtClean="0"/>
+              <a:rPr lang="zh-TW" altLang="en-US"/>
               <a:t>按一下以編輯母片標題樣式</a:t>
             </a:r>
-            <a:endParaRPr lang="zh-TW" altLang="en-US"/>
           </a:p>
         </p:txBody>
       </p:sp>
@@ -3710,7 +3693,7 @@
           </a:lstStyle>
           <a:p>
             <a:pPr lvl="0"/>
-            <a:endParaRPr lang="zh-TW" altLang="en-US" noProof="0" smtClean="0"/>
+            <a:endParaRPr lang="zh-TW" altLang="en-US" noProof="0"/>
           </a:p>
         </p:txBody>
       </p:sp>
@@ -3773,7 +3756,7 @@
           <a:p>
             <a:pPr lvl="0"/>
             <a:r>
-              <a:rPr lang="zh-TW" altLang="en-US" smtClean="0"/>
+              <a:rPr lang="zh-TW" altLang="en-US"/>
               <a:t>按一下以編輯母片文字樣式</a:t>
             </a:r>
           </a:p>
@@ -5122,7 +5105,7 @@
           <a:p>
             <a:pPr lvl="0"/>
             <a:r>
-              <a:rPr lang="zh-TW" altLang="en-US" smtClean="0"/>
+              <a:rPr lang="zh-TW" altLang="en-US"/>
               <a:t>按一下以編輯母片標題樣式</a:t>
             </a:r>
           </a:p>
@@ -5190,35 +5173,35 @@
           <a:p>
             <a:pPr lvl="0"/>
             <a:r>
-              <a:rPr lang="zh-TW" altLang="en-US" smtClean="0"/>
+              <a:rPr lang="zh-TW" altLang="en-US"/>
               <a:t>按一下以編輯母片</a:t>
             </a:r>
           </a:p>
           <a:p>
             <a:pPr lvl="1"/>
             <a:r>
-              <a:rPr lang="zh-TW" altLang="en-US" smtClean="0"/>
+              <a:rPr lang="zh-TW" altLang="en-US"/>
               <a:t>第二層</a:t>
             </a:r>
           </a:p>
           <a:p>
             <a:pPr lvl="2"/>
             <a:r>
-              <a:rPr lang="zh-TW" altLang="en-US" smtClean="0"/>
+              <a:rPr lang="zh-TW" altLang="en-US"/>
               <a:t>第三層</a:t>
             </a:r>
           </a:p>
           <a:p>
             <a:pPr lvl="3"/>
             <a:r>
-              <a:rPr lang="zh-TW" altLang="en-US" smtClean="0"/>
+              <a:rPr lang="zh-TW" altLang="en-US"/>
               <a:t>第四層</a:t>
             </a:r>
           </a:p>
           <a:p>
             <a:pPr lvl="4"/>
             <a:r>
-              <a:rPr lang="zh-TW" altLang="en-US" smtClean="0"/>
+              <a:rPr lang="zh-TW" altLang="en-US"/>
               <a:t>第五層</a:t>
             </a:r>
           </a:p>
@@ -5924,7 +5907,7 @@
           <a:p>
             <a:pPr eaLnBrk="1" hangingPunct="1"/>
             <a:r>
-              <a:rPr lang="en-US" altLang="zh-TW" dirty="0" smtClean="0"/>
+              <a:rPr lang="en-US" altLang="zh-TW" dirty="0"/>
               <a:t>Term Project</a:t>
             </a:r>
           </a:p>
@@ -5947,7 +5930,7 @@
           <a:p>
             <a:pPr eaLnBrk="1" hangingPunct="1"/>
             <a:r>
-              <a:rPr lang="en-US" altLang="zh-TW" dirty="0" smtClean="0"/>
+              <a:rPr lang="en-US" altLang="zh-TW" dirty="0"/>
               <a:t>Parallel and network computing</a:t>
             </a:r>
           </a:p>
@@ -5994,7 +5977,7 @@
           <a:lstStyle/>
           <a:p>
             <a:r>
-              <a:rPr lang="en-US" altLang="zh-TW" dirty="0" smtClean="0"/>
+              <a:rPr lang="en-US" altLang="zh-TW" dirty="0"/>
               <a:t>Do one of the following projects</a:t>
             </a:r>
             <a:endParaRPr lang="zh-TW" altLang="en-US" dirty="0"/>
@@ -6020,8 +6003,8 @@
               <a:buAutoNum type="arabicPeriod"/>
             </a:pPr>
             <a:r>
-              <a:rPr lang="en-US" altLang="zh-TW" dirty="0" smtClean="0"/>
-              <a:t>Find prime numbers in parallel</a:t>
+              <a:rPr lang="en-US" altLang="zh-TW" dirty="0"/>
+              <a:t>Parallel sorting over 1M floating-point numbers</a:t>
             </a:r>
           </a:p>
           <a:p>
@@ -6029,22 +6012,17 @@
               <a:buAutoNum type="arabicPeriod"/>
             </a:pPr>
             <a:r>
-              <a:rPr lang="en-US" altLang="zh-TW" dirty="0" smtClean="0"/>
+              <a:rPr lang="en-US" altLang="zh-TW" dirty="0"/>
               <a:t>File syncing to the cloud</a:t>
             </a:r>
-            <a:endParaRPr lang="en-US" altLang="zh-TW" dirty="0" smtClean="0"/>
           </a:p>
           <a:p>
             <a:pPr marL="514350" indent="-514350">
               <a:buAutoNum type="arabicPeriod"/>
             </a:pPr>
             <a:r>
-              <a:rPr lang="en-US" altLang="zh-TW" dirty="0" smtClean="0"/>
-              <a:t>Login </a:t>
-            </a:r>
-            <a:r>
-              <a:rPr lang="en-US" altLang="zh-TW" dirty="0" smtClean="0"/>
-              <a:t>shell</a:t>
+              <a:rPr lang="en-US" altLang="zh-TW" dirty="0"/>
+              <a:t>Login shell</a:t>
             </a:r>
             <a:endParaRPr lang="zh-TW" altLang="en-US" dirty="0"/>
           </a:p>
@@ -6096,8 +6074,8 @@
           <a:lstStyle/>
           <a:p>
             <a:r>
-              <a:rPr lang="en-US" altLang="zh-TW" dirty="0" smtClean="0"/>
-              <a:t>Project: Prime Numbers</a:t>
+              <a:rPr lang="en-US" altLang="zh-TW" dirty="0"/>
+              <a:t>Project: Parallel Sorting</a:t>
             </a:r>
             <a:endParaRPr lang="zh-TW" altLang="en-US" dirty="0"/>
           </a:p>
@@ -6119,34 +6097,49 @@
           <a:lstStyle/>
           <a:p>
             <a:r>
-              <a:rPr lang="en-US" altLang="zh-TW" dirty="0" smtClean="0"/>
-              <a:t>Find all prime numbers under 1,000,000</a:t>
-            </a:r>
-          </a:p>
-          <a:p>
-            <a:r>
-              <a:rPr lang="en-US" altLang="zh-TW" dirty="0" smtClean="0"/>
+              <a:rPr lang="en-US" altLang="zh-TW" dirty="0"/>
+              <a:t>Sort 1M floating point numbers in non-descending order</a:t>
+            </a:r>
+          </a:p>
+          <a:p>
+            <a:pPr lvl="1"/>
+            <a:r>
+              <a:rPr lang="en-US" altLang="zh-TW" dirty="0"/>
+              <a:t>the TA will prepare the test data file</a:t>
+            </a:r>
+          </a:p>
+          <a:p>
+            <a:pPr lvl="1"/>
+            <a:r>
+              <a:rPr lang="en-US" altLang="zh-TW" dirty="0"/>
+              <a:t>Execute on a 4-core PC</a:t>
+            </a:r>
+          </a:p>
+          <a:p>
+            <a:r>
+              <a:rPr lang="en-US" altLang="zh-TW" dirty="0"/>
               <a:t>Grading policy:</a:t>
             </a:r>
           </a:p>
           <a:p>
             <a:pPr lvl="1"/>
             <a:r>
-              <a:rPr lang="en-US" altLang="zh-TW" dirty="0" smtClean="0"/>
-              <a:t>Multi-core: 70 - 85</a:t>
+              <a:rPr lang="en-US" altLang="zh-TW" dirty="0"/>
+              <a:t>Basic: 70</a:t>
+            </a:r>
+            <a:r>
+              <a:rPr lang="zh-TW" altLang="en-US" dirty="0"/>
+              <a:t> </a:t>
+            </a:r>
+            <a:r>
+              <a:rPr lang="en-US" altLang="zh-TW" dirty="0"/>
+              <a:t>(functional correct)</a:t>
             </a:r>
           </a:p>
           <a:p>
             <a:pPr lvl="1"/>
             <a:r>
-              <a:rPr lang="en-US" altLang="zh-TW" dirty="0" smtClean="0"/>
-              <a:t>Networking with 4+ PCs: 80 - 99</a:t>
-            </a:r>
-          </a:p>
-          <a:p>
-            <a:pPr lvl="1"/>
-            <a:r>
-              <a:rPr lang="en-US" altLang="zh-TW" dirty="0" smtClean="0">
+              <a:rPr lang="en-US" altLang="zh-TW" dirty="0">
                 <a:solidFill>
                   <a:srgbClr val="FF0000"/>
                 </a:solidFill>
@@ -6205,12 +6198,8 @@
           <a:lstStyle/>
           <a:p>
             <a:r>
-              <a:rPr lang="en-US" altLang="zh-TW" dirty="0" smtClean="0"/>
-              <a:t>Project: </a:t>
-            </a:r>
-            <a:r>
-              <a:rPr lang="en-US" altLang="zh-TW" dirty="0" smtClean="0"/>
-              <a:t>File syncing to the cloud</a:t>
+              <a:rPr lang="en-US" altLang="zh-TW" dirty="0"/>
+              <a:t>Project: File syncing to the cloud</a:t>
             </a:r>
             <a:endParaRPr lang="zh-TW" altLang="en-US" dirty="0"/>
           </a:p>
@@ -6232,26 +6221,26 @@
           <a:lstStyle/>
           <a:p>
             <a:r>
-              <a:rPr lang="en-US" altLang="zh-TW" sz="2400" dirty="0" smtClean="0"/>
+              <a:rPr lang="en-US" altLang="zh-TW" sz="2400" dirty="0"/>
               <a:t>Major Function: sync all files in a dedicated directory to a remote server</a:t>
             </a:r>
           </a:p>
           <a:p>
             <a:pPr lvl="1"/>
             <a:r>
-              <a:rPr lang="en-US" altLang="zh-TW" sz="2000" dirty="0" smtClean="0"/>
+              <a:rPr lang="en-US" altLang="zh-TW" sz="2000" dirty="0"/>
               <a:t>Like </a:t>
             </a:r>
             <a:r>
-              <a:rPr lang="en-US" altLang="zh-TW" sz="2000" dirty="0" err="1" smtClean="0"/>
+              <a:rPr lang="en-US" altLang="zh-TW" sz="2000" dirty="0" err="1"/>
               <a:t>dropbox</a:t>
             </a:r>
-            <a:endParaRPr lang="en-US" altLang="zh-TW" sz="2000" dirty="0" smtClean="0"/>
+            <a:endParaRPr lang="en-US" altLang="zh-TW" sz="2000" dirty="0"/>
           </a:p>
           <a:p>
             <a:pPr lvl="1"/>
             <a:r>
-              <a:rPr lang="en-US" altLang="zh-TW" sz="2000" dirty="0" smtClean="0">
+              <a:rPr lang="en-US" altLang="zh-TW" sz="2000" dirty="0">
                 <a:solidFill>
                   <a:srgbClr val="FF0000"/>
                 </a:solidFill>
@@ -6261,49 +6250,42 @@
           </a:p>
           <a:p>
             <a:r>
-              <a:rPr lang="en-US" altLang="zh-TW" sz="2400" dirty="0" smtClean="0"/>
-              <a:t>Basic (60</a:t>
-            </a:r>
-            <a:r>
-              <a:rPr lang="en-US" altLang="zh-TW" sz="2400" dirty="0" smtClean="0"/>
-              <a:t>%):</a:t>
-            </a:r>
-            <a:r>
-              <a:rPr lang="zh-TW" altLang="en-US" sz="2400" dirty="0" smtClean="0"/>
+              <a:rPr lang="en-US" altLang="zh-TW" sz="2400" dirty="0"/>
+              <a:t>Basic (60%):</a:t>
+            </a:r>
+            <a:r>
+              <a:rPr lang="zh-TW" altLang="en-US" sz="2400" dirty="0"/>
               <a:t> </a:t>
             </a:r>
             <a:r>
-              <a:rPr lang="en-US" altLang="zh-TW" sz="2400" dirty="0" smtClean="0"/>
+              <a:rPr lang="en-US" altLang="zh-TW" sz="2400" dirty="0"/>
               <a:t>automatic backup files (in a flat directory) to another directory</a:t>
             </a:r>
-            <a:endParaRPr lang="en-US" altLang="zh-TW" sz="2400" dirty="0" smtClean="0"/>
-          </a:p>
-          <a:p>
-            <a:r>
-              <a:rPr lang="en-US" altLang="zh-TW" sz="2400" dirty="0" smtClean="0"/>
+          </a:p>
+          <a:p>
+            <a:r>
+              <a:rPr lang="en-US" altLang="zh-TW" sz="2400" dirty="0"/>
               <a:t>Bonus:</a:t>
             </a:r>
           </a:p>
           <a:p>
             <a:pPr lvl="1"/>
             <a:r>
-              <a:rPr lang="en-US" altLang="zh-TW" sz="2000" dirty="0" smtClean="0"/>
+              <a:rPr lang="en-US" altLang="zh-TW" sz="2000" dirty="0"/>
               <a:t>Automatic upload to a remote server (+10%)</a:t>
             </a:r>
-            <a:endParaRPr lang="en-US" altLang="zh-TW" sz="2000" dirty="0" smtClean="0"/>
           </a:p>
           <a:p>
             <a:pPr lvl="1"/>
             <a:r>
-              <a:rPr lang="en-US" altLang="zh-TW" sz="2000" dirty="0" smtClean="0"/>
+              <a:rPr lang="en-US" altLang="zh-TW" sz="2000" dirty="0"/>
               <a:t>Automatic download from a remote server (+15%)</a:t>
             </a:r>
-            <a:endParaRPr lang="en-US" altLang="zh-TW" sz="2000" dirty="0" smtClean="0"/>
           </a:p>
           <a:p>
             <a:pPr lvl="1"/>
             <a:r>
-              <a:rPr lang="en-US" altLang="zh-TW" sz="2000" dirty="0" smtClean="0"/>
+              <a:rPr lang="en-US" altLang="zh-TW" sz="2000" dirty="0"/>
               <a:t>Automatic sync the whole directory tree (+15%)</a:t>
             </a:r>
             <a:endParaRPr lang="zh-TW" altLang="en-US" sz="2000" dirty="0"/>
@@ -6356,7 +6338,7 @@
           <a:lstStyle/>
           <a:p>
             <a:r>
-              <a:rPr lang="en-US" altLang="zh-TW" dirty="0" smtClean="0"/>
+              <a:rPr lang="en-US" altLang="zh-TW" dirty="0"/>
               <a:t>Project: Login Shell</a:t>
             </a:r>
             <a:endParaRPr lang="zh-TW" altLang="en-US" dirty="0"/>
@@ -6379,77 +6361,77 @@
           <a:lstStyle/>
           <a:p>
             <a:r>
-              <a:rPr lang="en-US" altLang="zh-TW" sz="2400" dirty="0" smtClean="0"/>
+              <a:rPr lang="en-US" altLang="zh-TW" sz="2400" dirty="0"/>
               <a:t>Basic: a shell program capable of execution a single command each time</a:t>
             </a:r>
           </a:p>
           <a:p>
             <a:pPr lvl="1"/>
             <a:r>
-              <a:rPr lang="en-US" altLang="zh-TW" sz="2000" dirty="0" smtClean="0"/>
+              <a:rPr lang="en-US" altLang="zh-TW" sz="2000" dirty="0"/>
               <a:t>Basic functionality:</a:t>
             </a:r>
           </a:p>
           <a:p>
             <a:pPr lvl="2"/>
             <a:r>
-              <a:rPr lang="en-US" altLang="zh-TW" sz="1800" dirty="0" smtClean="0"/>
+              <a:rPr lang="en-US" altLang="zh-TW" sz="1800" dirty="0"/>
               <a:t>cd, </a:t>
             </a:r>
             <a:r>
-              <a:rPr lang="en-US" altLang="zh-TW" sz="1800" dirty="0" err="1" smtClean="0"/>
+              <a:rPr lang="en-US" altLang="zh-TW" sz="1800" dirty="0" err="1"/>
               <a:t>mkdir</a:t>
             </a:r>
             <a:r>
-              <a:rPr lang="en-US" altLang="zh-TW" sz="1800" dirty="0" smtClean="0"/>
+              <a:rPr lang="en-US" altLang="zh-TW" sz="1800" dirty="0"/>
               <a:t>, set environment variables</a:t>
             </a:r>
           </a:p>
           <a:p>
             <a:pPr lvl="2"/>
             <a:r>
-              <a:rPr lang="en-US" altLang="zh-TW" sz="1800" dirty="0" smtClean="0"/>
+              <a:rPr lang="en-US" altLang="zh-TW" sz="1800" dirty="0"/>
               <a:t>Automatic path search</a:t>
             </a:r>
           </a:p>
           <a:p>
             <a:pPr lvl="1"/>
             <a:r>
-              <a:rPr lang="en-US" altLang="zh-TW" sz="2000" dirty="0" smtClean="0"/>
+              <a:rPr lang="en-US" altLang="zh-TW" sz="2000" dirty="0"/>
               <a:t>Single machine (60%)</a:t>
             </a:r>
           </a:p>
           <a:p>
             <a:pPr lvl="1"/>
             <a:r>
-              <a:rPr lang="en-US" altLang="zh-TW" sz="2000" dirty="0" smtClean="0"/>
+              <a:rPr lang="en-US" altLang="zh-TW" sz="2000" dirty="0"/>
               <a:t>Login shell through network (80%)</a:t>
             </a:r>
           </a:p>
           <a:p>
             <a:r>
-              <a:rPr lang="en-US" altLang="zh-TW" sz="2400" dirty="0" smtClean="0"/>
+              <a:rPr lang="en-US" altLang="zh-TW" sz="2400" dirty="0"/>
               <a:t>Bonus:</a:t>
             </a:r>
           </a:p>
           <a:p>
             <a:pPr lvl="1"/>
             <a:r>
-              <a:rPr lang="en-US" altLang="zh-TW" sz="2000" dirty="0" smtClean="0"/>
+              <a:rPr lang="en-US" altLang="zh-TW" sz="2000" dirty="0"/>
               <a:t>Redirect outcome to files (+10%)</a:t>
             </a:r>
           </a:p>
           <a:p>
             <a:pPr lvl="1"/>
             <a:r>
-              <a:rPr lang="en-US" altLang="zh-TW" sz="2000" dirty="0" smtClean="0"/>
+              <a:rPr lang="en-US" altLang="zh-TW" sz="2000" dirty="0"/>
               <a:t>Piped job execution (+10%)</a:t>
             </a:r>
           </a:p>
           <a:p>
             <a:pPr lvl="1"/>
             <a:r>
-              <a:rPr lang="en-US" altLang="zh-TW" sz="2000" dirty="0" smtClean="0"/>
+              <a:rPr lang="en-US" altLang="zh-TW" sz="2000" dirty="0"/>
               <a:t>Execute background job (+10%)</a:t>
             </a:r>
           </a:p>

</xml_diff>